<commit_message>
update for improve optimization convergence using scheduler into the training
</commit_message>
<xml_diff>
--- a/Update 9 March 2023.pptx
+++ b/Update 9 March 2023.pptx
@@ -282,7 +282,7 @@
           <a:p>
             <a:fld id="{61003E16-CF0E-1F47-AEE2-EECEFEC0B439}" type="datetimeFigureOut">
               <a:rPr lang="en-DK" smtClean="0"/>
-              <a:t>10/04/2023</a:t>
+              <a:t>15/04/2023</a:t>
             </a:fld>
             <a:endParaRPr lang="en-DK"/>
           </a:p>
@@ -482,7 +482,7 @@
           <a:p>
             <a:fld id="{61003E16-CF0E-1F47-AEE2-EECEFEC0B439}" type="datetimeFigureOut">
               <a:rPr lang="en-DK" smtClean="0"/>
-              <a:t>10/04/2023</a:t>
+              <a:t>15/04/2023</a:t>
             </a:fld>
             <a:endParaRPr lang="en-DK"/>
           </a:p>
@@ -692,7 +692,7 @@
           <a:p>
             <a:fld id="{61003E16-CF0E-1F47-AEE2-EECEFEC0B439}" type="datetimeFigureOut">
               <a:rPr lang="en-DK" smtClean="0"/>
-              <a:t>10/04/2023</a:t>
+              <a:t>15/04/2023</a:t>
             </a:fld>
             <a:endParaRPr lang="en-DK"/>
           </a:p>
@@ -892,7 +892,7 @@
           <a:p>
             <a:fld id="{61003E16-CF0E-1F47-AEE2-EECEFEC0B439}" type="datetimeFigureOut">
               <a:rPr lang="en-DK" smtClean="0"/>
-              <a:t>10/04/2023</a:t>
+              <a:t>15/04/2023</a:t>
             </a:fld>
             <a:endParaRPr lang="en-DK"/>
           </a:p>
@@ -1168,7 +1168,7 @@
           <a:p>
             <a:fld id="{61003E16-CF0E-1F47-AEE2-EECEFEC0B439}" type="datetimeFigureOut">
               <a:rPr lang="en-DK" smtClean="0"/>
-              <a:t>10/04/2023</a:t>
+              <a:t>15/04/2023</a:t>
             </a:fld>
             <a:endParaRPr lang="en-DK"/>
           </a:p>
@@ -1436,7 +1436,7 @@
           <a:p>
             <a:fld id="{61003E16-CF0E-1F47-AEE2-EECEFEC0B439}" type="datetimeFigureOut">
               <a:rPr lang="en-DK" smtClean="0"/>
-              <a:t>10/04/2023</a:t>
+              <a:t>15/04/2023</a:t>
             </a:fld>
             <a:endParaRPr lang="en-DK"/>
           </a:p>
@@ -1851,7 +1851,7 @@
           <a:p>
             <a:fld id="{61003E16-CF0E-1F47-AEE2-EECEFEC0B439}" type="datetimeFigureOut">
               <a:rPr lang="en-DK" smtClean="0"/>
-              <a:t>10/04/2023</a:t>
+              <a:t>15/04/2023</a:t>
             </a:fld>
             <a:endParaRPr lang="en-DK"/>
           </a:p>
@@ -1993,7 +1993,7 @@
           <a:p>
             <a:fld id="{61003E16-CF0E-1F47-AEE2-EECEFEC0B439}" type="datetimeFigureOut">
               <a:rPr lang="en-DK" smtClean="0"/>
-              <a:t>10/04/2023</a:t>
+              <a:t>15/04/2023</a:t>
             </a:fld>
             <a:endParaRPr lang="en-DK"/>
           </a:p>
@@ -2106,7 +2106,7 @@
           <a:p>
             <a:fld id="{61003E16-CF0E-1F47-AEE2-EECEFEC0B439}" type="datetimeFigureOut">
               <a:rPr lang="en-DK" smtClean="0"/>
-              <a:t>10/04/2023</a:t>
+              <a:t>15/04/2023</a:t>
             </a:fld>
             <a:endParaRPr lang="en-DK"/>
           </a:p>
@@ -2419,7 +2419,7 @@
           <a:p>
             <a:fld id="{61003E16-CF0E-1F47-AEE2-EECEFEC0B439}" type="datetimeFigureOut">
               <a:rPr lang="en-DK" smtClean="0"/>
-              <a:t>10/04/2023</a:t>
+              <a:t>15/04/2023</a:t>
             </a:fld>
             <a:endParaRPr lang="en-DK"/>
           </a:p>
@@ -2708,7 +2708,7 @@
           <a:p>
             <a:fld id="{61003E16-CF0E-1F47-AEE2-EECEFEC0B439}" type="datetimeFigureOut">
               <a:rPr lang="en-DK" smtClean="0"/>
-              <a:t>10/04/2023</a:t>
+              <a:t>15/04/2023</a:t>
             </a:fld>
             <a:endParaRPr lang="en-DK"/>
           </a:p>
@@ -2951,7 +2951,7 @@
           <a:p>
             <a:fld id="{61003E16-CF0E-1F47-AEE2-EECEFEC0B439}" type="datetimeFigureOut">
               <a:rPr lang="en-DK" smtClean="0"/>
-              <a:t>10/04/2023</a:t>
+              <a:t>15/04/2023</a:t>
             </a:fld>
             <a:endParaRPr lang="en-DK"/>
           </a:p>
@@ -14167,8 +14167,8 @@
           </a:fontRef>
         </p:style>
       </p:cxnSp>
-      <mc:AlternateContent xmlns:mc="http://schemas.openxmlformats.org/markup-compatibility/2006">
-        <mc:Choice xmlns:a14="http://schemas.microsoft.com/office/drawing/2010/main" Requires="a14">
+      <mc:AlternateContent xmlns:mc="http://schemas.openxmlformats.org/markup-compatibility/2006" xmlns:a14="http://schemas.microsoft.com/office/drawing/2010/main">
+        <mc:Choice Requires="a14">
           <p:sp>
             <p:nvSpPr>
               <p:cNvPr id="140" name="TextBox 139">
@@ -14218,7 +14218,7 @@
             </p:txBody>
           </p:sp>
         </mc:Choice>
-        <mc:Fallback>
+        <mc:Fallback xmlns="">
           <p:sp>
             <p:nvSpPr>
               <p:cNvPr id="140" name="TextBox 139">
@@ -14263,8 +14263,8 @@
           </p:sp>
         </mc:Fallback>
       </mc:AlternateContent>
-      <mc:AlternateContent xmlns:mc="http://schemas.openxmlformats.org/markup-compatibility/2006">
-        <mc:Choice xmlns:a14="http://schemas.microsoft.com/office/drawing/2010/main" Requires="a14">
+      <mc:AlternateContent xmlns:mc="http://schemas.openxmlformats.org/markup-compatibility/2006" xmlns:a14="http://schemas.microsoft.com/office/drawing/2010/main">
+        <mc:Choice Requires="a14">
           <p:sp>
             <p:nvSpPr>
               <p:cNvPr id="141" name="TextBox 140">
@@ -14326,7 +14326,7 @@
             </p:txBody>
           </p:sp>
         </mc:Choice>
-        <mc:Fallback>
+        <mc:Fallback xmlns="">
           <p:sp>
             <p:nvSpPr>
               <p:cNvPr id="141" name="TextBox 140">
@@ -14371,8 +14371,8 @@
           </p:sp>
         </mc:Fallback>
       </mc:AlternateContent>
-      <mc:AlternateContent xmlns:mc="http://schemas.openxmlformats.org/markup-compatibility/2006">
-        <mc:Choice xmlns:a14="http://schemas.microsoft.com/office/drawing/2010/main" Requires="a14">
+      <mc:AlternateContent xmlns:mc="http://schemas.openxmlformats.org/markup-compatibility/2006" xmlns:a14="http://schemas.microsoft.com/office/drawing/2010/main">
+        <mc:Choice Requires="a14">
           <p:sp>
             <p:nvSpPr>
               <p:cNvPr id="142" name="TextBox 141">
@@ -14434,7 +14434,7 @@
             </p:txBody>
           </p:sp>
         </mc:Choice>
-        <mc:Fallback>
+        <mc:Fallback xmlns="">
           <p:sp>
             <p:nvSpPr>
               <p:cNvPr id="142" name="TextBox 141">
@@ -14479,8 +14479,8 @@
           </p:sp>
         </mc:Fallback>
       </mc:AlternateContent>
-      <mc:AlternateContent xmlns:mc="http://schemas.openxmlformats.org/markup-compatibility/2006">
-        <mc:Choice xmlns:a14="http://schemas.microsoft.com/office/drawing/2010/main" Requires="a14">
+      <mc:AlternateContent xmlns:mc="http://schemas.openxmlformats.org/markup-compatibility/2006" xmlns:a14="http://schemas.microsoft.com/office/drawing/2010/main">
+        <mc:Choice Requires="a14">
           <p:sp>
             <p:nvSpPr>
               <p:cNvPr id="143" name="TextBox 142">
@@ -14593,7 +14593,7 @@
             </p:txBody>
           </p:sp>
         </mc:Choice>
-        <mc:Fallback>
+        <mc:Fallback xmlns="">
           <p:sp>
             <p:nvSpPr>
               <p:cNvPr id="143" name="TextBox 142">
@@ -14638,8 +14638,8 @@
           </p:sp>
         </mc:Fallback>
       </mc:AlternateContent>
-      <mc:AlternateContent xmlns:mc="http://schemas.openxmlformats.org/markup-compatibility/2006">
-        <mc:Choice xmlns:a14="http://schemas.microsoft.com/office/drawing/2010/main" Requires="a14">
+      <mc:AlternateContent xmlns:mc="http://schemas.openxmlformats.org/markup-compatibility/2006" xmlns:a14="http://schemas.microsoft.com/office/drawing/2010/main">
+        <mc:Choice Requires="a14">
           <p:sp>
             <p:nvSpPr>
               <p:cNvPr id="144" name="TextBox 143">
@@ -14739,7 +14739,7 @@
             </p:txBody>
           </p:sp>
         </mc:Choice>
-        <mc:Fallback>
+        <mc:Fallback xmlns="">
           <p:sp>
             <p:nvSpPr>
               <p:cNvPr id="144" name="TextBox 143">
@@ -14784,8 +14784,8 @@
           </p:sp>
         </mc:Fallback>
       </mc:AlternateContent>
-      <mc:AlternateContent xmlns:mc="http://schemas.openxmlformats.org/markup-compatibility/2006">
-        <mc:Choice xmlns:a14="http://schemas.microsoft.com/office/drawing/2010/main" Requires="a14">
+      <mc:AlternateContent xmlns:mc="http://schemas.openxmlformats.org/markup-compatibility/2006" xmlns:a14="http://schemas.microsoft.com/office/drawing/2010/main">
+        <mc:Choice Requires="a14">
           <p:sp>
             <p:nvSpPr>
               <p:cNvPr id="145" name="TextBox 144">
@@ -14854,7 +14854,7 @@
             </p:txBody>
           </p:sp>
         </mc:Choice>
-        <mc:Fallback>
+        <mc:Fallback xmlns="">
           <p:sp>
             <p:nvSpPr>
               <p:cNvPr id="145" name="TextBox 144">
@@ -14899,8 +14899,8 @@
           </p:sp>
         </mc:Fallback>
       </mc:AlternateContent>
-      <mc:AlternateContent xmlns:mc="http://schemas.openxmlformats.org/markup-compatibility/2006">
-        <mc:Choice xmlns:a14="http://schemas.microsoft.com/office/drawing/2010/main" Requires="a14">
+      <mc:AlternateContent xmlns:mc="http://schemas.openxmlformats.org/markup-compatibility/2006" xmlns:a14="http://schemas.microsoft.com/office/drawing/2010/main">
+        <mc:Choice Requires="a14">
           <p:sp>
             <p:nvSpPr>
               <p:cNvPr id="146" name="TextBox 145">
@@ -14969,7 +14969,7 @@
             </p:txBody>
           </p:sp>
         </mc:Choice>
-        <mc:Fallback>
+        <mc:Fallback xmlns="">
           <p:sp>
             <p:nvSpPr>
               <p:cNvPr id="146" name="TextBox 145">
@@ -15014,8 +15014,8 @@
           </p:sp>
         </mc:Fallback>
       </mc:AlternateContent>
-      <mc:AlternateContent xmlns:mc="http://schemas.openxmlformats.org/markup-compatibility/2006">
-        <mc:Choice xmlns:a14="http://schemas.microsoft.com/office/drawing/2010/main" Requires="a14">
+      <mc:AlternateContent xmlns:mc="http://schemas.openxmlformats.org/markup-compatibility/2006" xmlns:a14="http://schemas.microsoft.com/office/drawing/2010/main">
+        <mc:Choice Requires="a14">
           <p:sp>
             <p:nvSpPr>
               <p:cNvPr id="147" name="TextBox 146">
@@ -15066,7 +15066,7 @@
             </p:txBody>
           </p:sp>
         </mc:Choice>
-        <mc:Fallback>
+        <mc:Fallback xmlns="">
           <p:sp>
             <p:nvSpPr>
               <p:cNvPr id="147" name="TextBox 146">
@@ -15291,8 +15291,8 @@
           </a:p>
         </p:txBody>
       </p:sp>
-      <mc:AlternateContent xmlns:mc="http://schemas.openxmlformats.org/markup-compatibility/2006">
-        <mc:Choice xmlns:a14="http://schemas.microsoft.com/office/drawing/2010/main" Requires="a14">
+      <mc:AlternateContent xmlns:mc="http://schemas.openxmlformats.org/markup-compatibility/2006" xmlns:a14="http://schemas.microsoft.com/office/drawing/2010/main">
+        <mc:Choice Requires="a14">
           <p:sp>
             <p:nvSpPr>
               <p:cNvPr id="152" name="TextBox 151">
@@ -15343,7 +15343,7 @@
             </p:txBody>
           </p:sp>
         </mc:Choice>
-        <mc:Fallback>
+        <mc:Fallback xmlns="">
           <p:sp>
             <p:nvSpPr>
               <p:cNvPr id="152" name="TextBox 151">
@@ -15507,8 +15507,8 @@
           </a:p>
         </p:txBody>
       </p:sp>
-      <mc:AlternateContent xmlns:mc="http://schemas.openxmlformats.org/markup-compatibility/2006">
-        <mc:Choice xmlns:a14="http://schemas.microsoft.com/office/drawing/2010/main" Requires="a14">
+      <mc:AlternateContent xmlns:mc="http://schemas.openxmlformats.org/markup-compatibility/2006" xmlns:a14="http://schemas.microsoft.com/office/drawing/2010/main">
+        <mc:Choice Requires="a14">
           <p:sp>
             <p:nvSpPr>
               <p:cNvPr id="1181" name="TextBox 1180">
@@ -15537,6 +15537,7 @@
               </a:bodyPr>
               <a:lstStyle/>
               <a:p>
+                <a:pPr/>
                 <a14:m>
                   <m:oMathPara xmlns:m="http://schemas.openxmlformats.org/officeDocument/2006/math">
                     <m:oMathParaPr>
@@ -15558,7 +15559,7 @@
             </p:txBody>
           </p:sp>
         </mc:Choice>
-        <mc:Fallback>
+        <mc:Fallback xmlns="">
           <p:sp>
             <p:nvSpPr>
               <p:cNvPr id="1181" name="TextBox 1180">
@@ -15673,8 +15674,8 @@
               </a:prstGeom>
             </p:spPr>
           </p:pic>
-          <mc:AlternateContent xmlns:mc="http://schemas.openxmlformats.org/markup-compatibility/2006">
-            <mc:Choice xmlns:a14="http://schemas.microsoft.com/office/drawing/2010/main" Requires="a14">
+          <mc:AlternateContent xmlns:mc="http://schemas.openxmlformats.org/markup-compatibility/2006" xmlns:a14="http://schemas.microsoft.com/office/drawing/2010/main">
+            <mc:Choice Requires="a14">
               <p:sp>
                 <p:nvSpPr>
                   <p:cNvPr id="12" name="TextBox 11">
@@ -15774,7 +15775,7 @@
                 </p:txBody>
               </p:sp>
             </mc:Choice>
-            <mc:Fallback>
+            <mc:Fallback xmlns="">
               <p:sp>
                 <p:nvSpPr>
                   <p:cNvPr id="12" name="TextBox 11">
@@ -25837,8 +25838,8 @@
               </a:p>
             </p:txBody>
           </p:sp>
-          <mc:AlternateContent xmlns:mc="http://schemas.openxmlformats.org/markup-compatibility/2006">
-            <mc:Choice xmlns:a14="http://schemas.microsoft.com/office/drawing/2010/main" Requires="a14">
+          <mc:AlternateContent xmlns:mc="http://schemas.openxmlformats.org/markup-compatibility/2006" xmlns:a14="http://schemas.microsoft.com/office/drawing/2010/main">
+            <mc:Choice Requires="a14">
               <p:sp>
                 <p:nvSpPr>
                   <p:cNvPr id="1186" name="TextBox 1185">
@@ -25907,7 +25908,7 @@
                 </p:txBody>
               </p:sp>
             </mc:Choice>
-            <mc:Fallback>
+            <mc:Fallback xmlns="">
               <p:sp>
                 <p:nvSpPr>
                   <p:cNvPr id="1186" name="TextBox 1185">
@@ -26699,8 +26700,8 @@
           </a:prstGeom>
         </p:spPr>
       </p:pic>
-      <mc:AlternateContent xmlns:mc="http://schemas.openxmlformats.org/markup-compatibility/2006">
-        <mc:Choice xmlns:a14="http://schemas.microsoft.com/office/drawing/2010/main" Requires="a14">
+      <mc:AlternateContent xmlns:mc="http://schemas.openxmlformats.org/markup-compatibility/2006" xmlns:a14="http://schemas.microsoft.com/office/drawing/2010/main">
+        <mc:Choice Requires="a14">
           <p:sp>
             <p:nvSpPr>
               <p:cNvPr id="12" name="TextBox 11">
@@ -26800,7 +26801,7 @@
             </p:txBody>
           </p:sp>
         </mc:Choice>
-        <mc:Fallback>
+        <mc:Fallback xmlns="">
           <p:sp>
             <p:nvSpPr>
               <p:cNvPr id="12" name="TextBox 11">
@@ -34338,7 +34339,7 @@
         </p:nvSpPr>
         <p:spPr>
           <a:xfrm>
-            <a:off x="10500414" y="5487059"/>
+            <a:off x="10253526" y="5487059"/>
             <a:ext cx="589256" cy="605263"/>
           </a:xfrm>
           <a:prstGeom prst="ellipse">
@@ -34535,7 +34536,7 @@
         </p:nvSpPr>
         <p:spPr>
           <a:xfrm>
-            <a:off x="10666973" y="4926786"/>
+            <a:off x="10420085" y="4926786"/>
             <a:ext cx="256139" cy="448212"/>
           </a:xfrm>
           <a:prstGeom prst="downArrow">
@@ -35352,8 +35353,8 @@
             </a:fontRef>
           </p:style>
         </p:cxnSp>
-        <mc:AlternateContent xmlns:mc="http://schemas.openxmlformats.org/markup-compatibility/2006">
-          <mc:Choice xmlns:a14="http://schemas.microsoft.com/office/drawing/2010/main" Requires="a14">
+        <mc:AlternateContent xmlns:mc="http://schemas.openxmlformats.org/markup-compatibility/2006" xmlns:a14="http://schemas.microsoft.com/office/drawing/2010/main">
+          <mc:Choice Requires="a14">
             <p:sp>
               <p:nvSpPr>
                 <p:cNvPr id="44" name="TextBox 43">
@@ -35403,7 +35404,7 @@
               </p:txBody>
             </p:sp>
           </mc:Choice>
-          <mc:Fallback>
+          <mc:Fallback xmlns="">
             <p:sp>
               <p:nvSpPr>
                 <p:cNvPr id="44" name="TextBox 43">
@@ -35448,8 +35449,8 @@
             </p:sp>
           </mc:Fallback>
         </mc:AlternateContent>
-        <mc:AlternateContent xmlns:mc="http://schemas.openxmlformats.org/markup-compatibility/2006">
-          <mc:Choice xmlns:a14="http://schemas.microsoft.com/office/drawing/2010/main" Requires="a14">
+        <mc:AlternateContent xmlns:mc="http://schemas.openxmlformats.org/markup-compatibility/2006" xmlns:a14="http://schemas.microsoft.com/office/drawing/2010/main">
+          <mc:Choice Requires="a14">
             <p:sp>
               <p:nvSpPr>
                 <p:cNvPr id="45" name="TextBox 44">
@@ -35511,7 +35512,7 @@
               </p:txBody>
             </p:sp>
           </mc:Choice>
-          <mc:Fallback>
+          <mc:Fallback xmlns="">
             <p:sp>
               <p:nvSpPr>
                 <p:cNvPr id="45" name="TextBox 44">
@@ -35556,8 +35557,8 @@
             </p:sp>
           </mc:Fallback>
         </mc:AlternateContent>
-        <mc:AlternateContent xmlns:mc="http://schemas.openxmlformats.org/markup-compatibility/2006">
-          <mc:Choice xmlns:a14="http://schemas.microsoft.com/office/drawing/2010/main" Requires="a14">
+        <mc:AlternateContent xmlns:mc="http://schemas.openxmlformats.org/markup-compatibility/2006" xmlns:a14="http://schemas.microsoft.com/office/drawing/2010/main">
+          <mc:Choice Requires="a14">
             <p:sp>
               <p:nvSpPr>
                 <p:cNvPr id="46" name="TextBox 45">
@@ -35619,7 +35620,7 @@
               </p:txBody>
             </p:sp>
           </mc:Choice>
-          <mc:Fallback>
+          <mc:Fallback xmlns="">
             <p:sp>
               <p:nvSpPr>
                 <p:cNvPr id="46" name="TextBox 45">
@@ -35664,8 +35665,8 @@
             </p:sp>
           </mc:Fallback>
         </mc:AlternateContent>
-        <mc:AlternateContent xmlns:mc="http://schemas.openxmlformats.org/markup-compatibility/2006">
-          <mc:Choice xmlns:a14="http://schemas.microsoft.com/office/drawing/2010/main" Requires="a14">
+        <mc:AlternateContent xmlns:mc="http://schemas.openxmlformats.org/markup-compatibility/2006" xmlns:a14="http://schemas.microsoft.com/office/drawing/2010/main">
+          <mc:Choice Requires="a14">
             <p:sp>
               <p:nvSpPr>
                 <p:cNvPr id="66" name="TextBox 65">
@@ -35778,7 +35779,7 @@
               </p:txBody>
             </p:sp>
           </mc:Choice>
-          <mc:Fallback>
+          <mc:Fallback xmlns="">
             <p:sp>
               <p:nvSpPr>
                 <p:cNvPr id="66" name="TextBox 65">
@@ -35823,8 +35824,8 @@
             </p:sp>
           </mc:Fallback>
         </mc:AlternateContent>
-        <mc:AlternateContent xmlns:mc="http://schemas.openxmlformats.org/markup-compatibility/2006">
-          <mc:Choice xmlns:a14="http://schemas.microsoft.com/office/drawing/2010/main" Requires="a14">
+        <mc:AlternateContent xmlns:mc="http://schemas.openxmlformats.org/markup-compatibility/2006" xmlns:a14="http://schemas.microsoft.com/office/drawing/2010/main">
+          <mc:Choice Requires="a14">
             <p:sp>
               <p:nvSpPr>
                 <p:cNvPr id="67" name="TextBox 66">
@@ -35924,7 +35925,7 @@
               </p:txBody>
             </p:sp>
           </mc:Choice>
-          <mc:Fallback>
+          <mc:Fallback xmlns="">
             <p:sp>
               <p:nvSpPr>
                 <p:cNvPr id="67" name="TextBox 66">
@@ -35969,8 +35970,8 @@
             </p:sp>
           </mc:Fallback>
         </mc:AlternateContent>
-        <mc:AlternateContent xmlns:mc="http://schemas.openxmlformats.org/markup-compatibility/2006">
-          <mc:Choice xmlns:a14="http://schemas.microsoft.com/office/drawing/2010/main" Requires="a14">
+        <mc:AlternateContent xmlns:mc="http://schemas.openxmlformats.org/markup-compatibility/2006" xmlns:a14="http://schemas.microsoft.com/office/drawing/2010/main">
+          <mc:Choice Requires="a14">
             <p:sp>
               <p:nvSpPr>
                 <p:cNvPr id="68" name="TextBox 67">
@@ -36039,7 +36040,7 @@
               </p:txBody>
             </p:sp>
           </mc:Choice>
-          <mc:Fallback>
+          <mc:Fallback xmlns="">
             <p:sp>
               <p:nvSpPr>
                 <p:cNvPr id="68" name="TextBox 67">
@@ -36084,8 +36085,8 @@
             </p:sp>
           </mc:Fallback>
         </mc:AlternateContent>
-        <mc:AlternateContent xmlns:mc="http://schemas.openxmlformats.org/markup-compatibility/2006">
-          <mc:Choice xmlns:a14="http://schemas.microsoft.com/office/drawing/2010/main" Requires="a14">
+        <mc:AlternateContent xmlns:mc="http://schemas.openxmlformats.org/markup-compatibility/2006" xmlns:a14="http://schemas.microsoft.com/office/drawing/2010/main">
+          <mc:Choice Requires="a14">
             <p:sp>
               <p:nvSpPr>
                 <p:cNvPr id="69" name="TextBox 68">
@@ -36136,7 +36137,7 @@
               </p:txBody>
             </p:sp>
           </mc:Choice>
-          <mc:Fallback>
+          <mc:Fallback xmlns="">
             <p:sp>
               <p:nvSpPr>
                 <p:cNvPr id="69" name="TextBox 68">
@@ -41496,7 +41497,7 @@
             </p:nvSpPr>
             <p:spPr>
               <a:xfrm>
-                <a:off x="10734385" y="5585245"/>
+                <a:off x="10487497" y="5585245"/>
                 <a:ext cx="180947" cy="276999"/>
               </a:xfrm>
               <a:prstGeom prst="rect">
@@ -41549,7 +41550,7 @@
             </p:nvSpPr>
             <p:spPr>
               <a:xfrm>
-                <a:off x="10734385" y="5585245"/>
+                <a:off x="10487497" y="5585245"/>
                 <a:ext cx="180947" cy="276999"/>
               </a:xfrm>
               <a:prstGeom prst="rect">
@@ -41558,7 +41559,7 @@
               <a:blipFill>
                 <a:blip r:embed="rId12"/>
                 <a:stretch>
-                  <a:fillRect l="-33333" r="-26667" b="-26087"/>
+                  <a:fillRect l="-25000" r="-25000" b="-26087"/>
                 </a:stretch>
               </a:blipFill>
             </p:spPr>
@@ -41577,8 +41578,8 @@
           </p:sp>
         </mc:Fallback>
       </mc:AlternateContent>
-      <mc:AlternateContent xmlns:mc="http://schemas.openxmlformats.org/markup-compatibility/2006">
-        <mc:Choice xmlns:a14="http://schemas.microsoft.com/office/drawing/2010/main" Requires="a14">
+      <mc:AlternateContent xmlns:mc="http://schemas.openxmlformats.org/markup-compatibility/2006" xmlns:a14="http://schemas.microsoft.com/office/drawing/2010/main">
+        <mc:Choice Requires="a14">
           <p:sp>
             <p:nvSpPr>
               <p:cNvPr id="1237" name="TextBox 1236">
@@ -41607,6 +41608,7 @@
               </a:bodyPr>
               <a:lstStyle/>
               <a:p>
+                <a:pPr/>
                 <a14:m>
                   <m:oMathPara xmlns:m="http://schemas.openxmlformats.org/officeDocument/2006/math">
                     <m:oMathParaPr>
@@ -41628,7 +41630,7 @@
             </p:txBody>
           </p:sp>
         </mc:Choice>
-        <mc:Fallback>
+        <mc:Fallback xmlns="">
           <p:sp>
             <p:nvSpPr>
               <p:cNvPr id="1237" name="TextBox 1236">

</xml_diff>